<commit_message>
changes to thread synchronization
</commit_message>
<xml_diff>
--- a/presentation/Java- Threads.pptx
+++ b/presentation/Java- Threads.pptx
@@ -199,7 +199,7 @@
           <a:p>
             <a:fld id="{B529C319-3B9D-4951-872A-1C8F8CE041CB}" type="datetimeFigureOut">
               <a:rPr lang="en-GB" smtClean="0"/>
-              <a:t>27/08/2016</a:t>
+              <a:t>31/08/2016</a:t>
             </a:fld>
             <a:endParaRPr lang="en-GB"/>
           </a:p>
@@ -1098,8 +1098,17 @@
             </a:r>
             <a:r>
               <a:rPr lang="en-US" baseline="0" dirty="0" smtClean="0"/>
-              <a:t> and show how we synchronize methods</a:t>
-            </a:r>
+              <a:t> and show how we </a:t>
+            </a:r>
+            <a:r>
+              <a:rPr lang="en-US" baseline="0" dirty="0" smtClean="0"/>
+              <a:t>synchronize block in the </a:t>
+            </a:r>
+            <a:r>
+              <a:rPr lang="en-US" baseline="0" smtClean="0"/>
+              <a:t>run method</a:t>
+            </a:r>
+            <a:endParaRPr lang="en-US" baseline="0" dirty="0" smtClean="0"/>
           </a:p>
           <a:p>
             <a:endParaRPr lang="en-US" dirty="0" smtClean="0"/>
@@ -1273,7 +1282,7 @@
           <a:p>
             <a:fld id="{CA7CCE79-BA54-4D29-AD51-F1B7072AB361}" type="datetimeFigureOut">
               <a:rPr lang="en-GB" smtClean="0"/>
-              <a:t>27/08/2016</a:t>
+              <a:t>31/08/2016</a:t>
             </a:fld>
             <a:endParaRPr lang="en-GB"/>
           </a:p>
@@ -1443,7 +1452,7 @@
           <a:p>
             <a:fld id="{CA7CCE79-BA54-4D29-AD51-F1B7072AB361}" type="datetimeFigureOut">
               <a:rPr lang="en-GB" smtClean="0"/>
-              <a:t>27/08/2016</a:t>
+              <a:t>31/08/2016</a:t>
             </a:fld>
             <a:endParaRPr lang="en-GB"/>
           </a:p>
@@ -1623,7 +1632,7 @@
           <a:p>
             <a:fld id="{CA7CCE79-BA54-4D29-AD51-F1B7072AB361}" type="datetimeFigureOut">
               <a:rPr lang="en-GB" smtClean="0"/>
-              <a:t>27/08/2016</a:t>
+              <a:t>31/08/2016</a:t>
             </a:fld>
             <a:endParaRPr lang="en-GB"/>
           </a:p>
@@ -1793,7 +1802,7 @@
           <a:p>
             <a:fld id="{CA7CCE79-BA54-4D29-AD51-F1B7072AB361}" type="datetimeFigureOut">
               <a:rPr lang="en-GB" smtClean="0"/>
-              <a:t>27/08/2016</a:t>
+              <a:t>31/08/2016</a:t>
             </a:fld>
             <a:endParaRPr lang="en-GB"/>
           </a:p>
@@ -2039,7 +2048,7 @@
           <a:p>
             <a:fld id="{CA7CCE79-BA54-4D29-AD51-F1B7072AB361}" type="datetimeFigureOut">
               <a:rPr lang="en-GB" smtClean="0"/>
-              <a:t>27/08/2016</a:t>
+              <a:t>31/08/2016</a:t>
             </a:fld>
             <a:endParaRPr lang="en-GB"/>
           </a:p>
@@ -2271,7 +2280,7 @@
           <a:p>
             <a:fld id="{CA7CCE79-BA54-4D29-AD51-F1B7072AB361}" type="datetimeFigureOut">
               <a:rPr lang="en-GB" smtClean="0"/>
-              <a:t>27/08/2016</a:t>
+              <a:t>31/08/2016</a:t>
             </a:fld>
             <a:endParaRPr lang="en-GB"/>
           </a:p>
@@ -2638,7 +2647,7 @@
           <a:p>
             <a:fld id="{CA7CCE79-BA54-4D29-AD51-F1B7072AB361}" type="datetimeFigureOut">
               <a:rPr lang="en-GB" smtClean="0"/>
-              <a:t>27/08/2016</a:t>
+              <a:t>31/08/2016</a:t>
             </a:fld>
             <a:endParaRPr lang="en-GB"/>
           </a:p>
@@ -2756,7 +2765,7 @@
           <a:p>
             <a:fld id="{CA7CCE79-BA54-4D29-AD51-F1B7072AB361}" type="datetimeFigureOut">
               <a:rPr lang="en-GB" smtClean="0"/>
-              <a:t>27/08/2016</a:t>
+              <a:t>31/08/2016</a:t>
             </a:fld>
             <a:endParaRPr lang="en-GB"/>
           </a:p>
@@ -2851,7 +2860,7 @@
           <a:p>
             <a:fld id="{CA7CCE79-BA54-4D29-AD51-F1B7072AB361}" type="datetimeFigureOut">
               <a:rPr lang="en-GB" smtClean="0"/>
-              <a:t>27/08/2016</a:t>
+              <a:t>31/08/2016</a:t>
             </a:fld>
             <a:endParaRPr lang="en-GB"/>
           </a:p>
@@ -3128,7 +3137,7 @@
           <a:p>
             <a:fld id="{CA7CCE79-BA54-4D29-AD51-F1B7072AB361}" type="datetimeFigureOut">
               <a:rPr lang="en-GB" smtClean="0"/>
-              <a:t>27/08/2016</a:t>
+              <a:t>31/08/2016</a:t>
             </a:fld>
             <a:endParaRPr lang="en-GB"/>
           </a:p>
@@ -3381,7 +3390,7 @@
           <a:p>
             <a:fld id="{CA7CCE79-BA54-4D29-AD51-F1B7072AB361}" type="datetimeFigureOut">
               <a:rPr lang="en-GB" smtClean="0"/>
-              <a:t>27/08/2016</a:t>
+              <a:t>31/08/2016</a:t>
             </a:fld>
             <a:endParaRPr lang="en-GB"/>
           </a:p>
@@ -3594,7 +3603,7 @@
           <a:p>
             <a:fld id="{CA7CCE79-BA54-4D29-AD51-F1B7072AB361}" type="datetimeFigureOut">
               <a:rPr lang="en-GB" smtClean="0"/>
-              <a:t>27/08/2016</a:t>
+              <a:t>31/08/2016</a:t>
             </a:fld>
             <a:endParaRPr lang="en-GB"/>
           </a:p>
@@ -6764,7 +6773,7 @@
   <a:extraClrSchemeLst/>
   <a:extLst>
     <a:ext uri="{05A4C25C-085E-4340-85A3-A5531E510DB2}">
-      <thm15:themeFamily xmlns:thm15="http://schemas.microsoft.com/office/thememl/2012/main" name="Office Theme" id="{62F939B6-93AF-4DB8-9C6B-D6C7DFDC589F}" vid="{4A3C46E8-61CC-4603-A589-7422A47A8E4A}"/>
+      <thm15:themeFamily xmlns:thm15="http://schemas.microsoft.com/office/thememl/2012/main" xmlns="" name="Office Theme" id="{62F939B6-93AF-4DB8-9C6B-D6C7DFDC589F}" vid="{4A3C46E8-61CC-4603-A589-7422A47A8E4A}"/>
     </a:ext>
   </a:extLst>
 </a:theme>
@@ -7025,7 +7034,7 @@
   <a:extraClrSchemeLst/>
   <a:extLst>
     <a:ext uri="{05A4C25C-085E-4340-85A3-A5531E510DB2}">
-      <thm15:themeFamily xmlns:thm15="http://schemas.microsoft.com/office/thememl/2012/main" name="Office Theme" id="{62F939B6-93AF-4DB8-9C6B-D6C7DFDC589F}" vid="{4A3C46E8-61CC-4603-A589-7422A47A8E4A}"/>
+      <thm15:themeFamily xmlns:thm15="http://schemas.microsoft.com/office/thememl/2012/main" xmlns="" name="Office Theme" id="{62F939B6-93AF-4DB8-9C6B-D6C7DFDC589F}" vid="{4A3C46E8-61CC-4603-A589-7422A47A8E4A}"/>
     </a:ext>
   </a:extLst>
 </a:theme>

</xml_diff>